<commit_message>
final project part 1_2
</commit_message>
<xml_diff>
--- a/Final_Project/Final Project, Part 1.pptx
+++ b/Final_Project/Final Project, Part 1.pptx
@@ -4125,7 +4125,15 @@
             </a:r>
             <a:r>
               <a:rPr lang="en-US" sz="1900" dirty="0" smtClean="0"/>
-              <a:t>My friend Brian, an engineer at One Medical, is working on an app that helps medical practices automate these types of tasks. He will provide a dataset containing few hundred labeled medical documents (as images) along with their text. We will select a subset of these types of documents to build a classifier (such as medical history records, lab results and release forms). Each document is the unit of observation, and features we will extract will contain parsed text and/or visual aspects of the images. </a:t>
+              <a:t>My friend Brian, an engineer at One Medical, is working on an app that helps medical practices automate these types of tasks. He will provide a dataset containing few hundred labeled medical documents (as images) along with their text. We will select a subset of these types of documents to build a classifier (such as medical history records, lab results and release forms). Each </a:t>
+            </a:r>
+            <a:r>
+              <a:rPr lang="en-US" sz="1900" dirty="0" smtClean="0"/>
+              <a:t>document page </a:t>
+            </a:r>
+            <a:r>
+              <a:rPr lang="en-US" sz="1900" dirty="0" smtClean="0"/>
+              <a:t>is the unit of observation, and features we will extract will contain parsed text and/or visual aspects of the images. </a:t>
             </a:r>
           </a:p>
           <a:p>

</xml_diff>